<commit_message>
additional html and API updates
</commit_message>
<xml_diff>
--- a/Assets/Project Presentation Template.pptx
+++ b/Assets/Project Presentation Template.pptx
@@ -247,6 +247,11 @@
       </a:defRPr>
     </a:lvl9pPr>
   </p:defaultTextStyle>
+  <p:extLst>
+    <p:ext uri="{EFAFB233-063F-42B5-8137-9DF3F51BA10A}">
+      <p15:sldGuideLst xmlns:p15="http://schemas.microsoft.com/office/powerpoint/2012/main"/>
+    </p:ext>
+  </p:extLst>
 </p:presentation>
 </file>
 
@@ -1588,7 +1593,7 @@
           <a:p>
             <a:fld id="{D3B4C6C1-0D67-408C-B75C-32915C4A0B44}" type="datetimeFigureOut">
               <a:rPr lang="en-US" smtClean="0"/>
-              <a:t>9/22/2020</a:t>
+              <a:t>9/23/2020</a:t>
             </a:fld>
             <a:endParaRPr lang="en-US"/>
           </a:p>
@@ -1928,7 +1933,7 @@
           <a:p>
             <a:fld id="{D3B4C6C1-0D67-408C-B75C-32915C4A0B44}" type="datetimeFigureOut">
               <a:rPr lang="en-US" smtClean="0"/>
-              <a:t>9/22/2020</a:t>
+              <a:t>9/23/2020</a:t>
             </a:fld>
             <a:endParaRPr lang="en-US"/>
           </a:p>
@@ -2118,7 +2123,7 @@
           <a:p>
             <a:fld id="{D3B4C6C1-0D67-408C-B75C-32915C4A0B44}" type="datetimeFigureOut">
               <a:rPr lang="en-US" smtClean="0"/>
-              <a:t>9/22/2020</a:t>
+              <a:t>9/23/2020</a:t>
             </a:fld>
             <a:endParaRPr lang="en-US"/>
           </a:p>
@@ -2903,7 +2908,7 @@
           <a:p>
             <a:fld id="{D3B4C6C1-0D67-408C-B75C-32915C4A0B44}" type="datetimeFigureOut">
               <a:rPr lang="en-US" smtClean="0"/>
-              <a:t>9/22/2020</a:t>
+              <a:t>9/23/2020</a:t>
             </a:fld>
             <a:endParaRPr lang="en-US"/>
           </a:p>
@@ -3190,7 +3195,7 @@
           <a:p>
             <a:fld id="{D3B4C6C1-0D67-408C-B75C-32915C4A0B44}" type="datetimeFigureOut">
               <a:rPr lang="en-US" smtClean="0"/>
-              <a:t>9/22/2020</a:t>
+              <a:t>9/23/2020</a:t>
             </a:fld>
             <a:endParaRPr lang="en-US"/>
           </a:p>
@@ -3594,7 +3599,7 @@
           <a:p>
             <a:fld id="{D3B4C6C1-0D67-408C-B75C-32915C4A0B44}" type="datetimeFigureOut">
               <a:rPr lang="en-US" smtClean="0"/>
-              <a:t>9/22/2020</a:t>
+              <a:t>9/23/2020</a:t>
             </a:fld>
             <a:endParaRPr lang="en-US"/>
           </a:p>
@@ -4081,7 +4086,7 @@
           <a:p>
             <a:fld id="{D3B4C6C1-0D67-408C-B75C-32915C4A0B44}" type="datetimeFigureOut">
               <a:rPr lang="en-US" smtClean="0"/>
-              <a:t>9/22/2020</a:t>
+              <a:t>9/23/2020</a:t>
             </a:fld>
             <a:endParaRPr lang="en-US"/>
           </a:p>
@@ -4209,7 +4214,7 @@
           <a:p>
             <a:fld id="{D3B4C6C1-0D67-408C-B75C-32915C4A0B44}" type="datetimeFigureOut">
               <a:rPr lang="en-US" smtClean="0"/>
-              <a:t>9/22/2020</a:t>
+              <a:t>9/23/2020</a:t>
             </a:fld>
             <a:endParaRPr lang="en-US"/>
           </a:p>
@@ -4314,7 +4319,7 @@
           <a:p>
             <a:fld id="{D3B4C6C1-0D67-408C-B75C-32915C4A0B44}" type="datetimeFigureOut">
               <a:rPr lang="en-US" smtClean="0"/>
-              <a:t>9/22/2020</a:t>
+              <a:t>9/23/2020</a:t>
             </a:fld>
             <a:endParaRPr lang="en-US"/>
           </a:p>
@@ -4669,7 +4674,7 @@
           <a:p>
             <a:fld id="{D3B4C6C1-0D67-408C-B75C-32915C4A0B44}" type="datetimeFigureOut">
               <a:rPr lang="en-US" smtClean="0"/>
-              <a:t>9/22/2020</a:t>
+              <a:t>9/23/2020</a:t>
             </a:fld>
             <a:endParaRPr lang="en-US"/>
           </a:p>
@@ -5067,7 +5072,7 @@
           <a:p>
             <a:fld id="{D3B4C6C1-0D67-408C-B75C-32915C4A0B44}" type="datetimeFigureOut">
               <a:rPr lang="en-US" smtClean="0"/>
-              <a:t>9/22/2020</a:t>
+              <a:t>9/23/2020</a:t>
             </a:fld>
             <a:endParaRPr lang="en-US"/>
           </a:p>
@@ -5355,7 +5360,7 @@
           <a:p>
             <a:fld id="{D3B4C6C1-0D67-408C-B75C-32915C4A0B44}" type="datetimeFigureOut">
               <a:rPr lang="en-US" smtClean="0"/>
-              <a:t>9/22/2020</a:t>
+              <a:t>9/23/2020</a:t>
             </a:fld>
             <a:endParaRPr lang="en-US"/>
           </a:p>
@@ -5966,6 +5971,13 @@
   <p:clrMapOvr>
     <a:masterClrMapping/>
   </p:clrMapOvr>
+  <p:timing>
+    <p:tnLst>
+      <p:par>
+        <p:cTn id="1" dur="indefinite" restart="never" nodeType="tmRoot"/>
+      </p:par>
+    </p:tnLst>
+  </p:timing>
 </p:sld>
 </file>
 
@@ -6033,6 +6045,13 @@
   <p:clrMapOvr>
     <a:masterClrMapping/>
   </p:clrMapOvr>
+  <p:timing>
+    <p:tnLst>
+      <p:par>
+        <p:cTn id="1" dur="indefinite" restart="never" nodeType="tmRoot"/>
+      </p:par>
+    </p:tnLst>
+  </p:timing>
 </p:sld>
 </file>
 
@@ -6152,7 +6171,15 @@
             </a:pPr>
             <a:r>
               <a:rPr lang="en-US" dirty="0" smtClean="0"/>
-              <a:t>Music is huge part of almost everyone’s daily lives. With many people spending hours per day on a computer, we wanted to create an application for users to easily search for their favorite artists.</a:t>
+              <a:t>Music is huge part of almost everyone’s daily lives. With many people spending hours per day on a computer, we wanted to create an application for users to easily </a:t>
+            </a:r>
+            <a:r>
+              <a:rPr lang="en-US" dirty="0" smtClean="0"/>
+              <a:t>search for top hits by </a:t>
+            </a:r>
+            <a:r>
+              <a:rPr lang="en-US" dirty="0" smtClean="0"/>
+              <a:t>their favorite artists.</a:t>
             </a:r>
             <a:br>
               <a:rPr lang="en-US" dirty="0" smtClean="0"/>
@@ -6186,7 +6213,11 @@
             </a:br>
             <a:r>
               <a:rPr lang="en" dirty="0" smtClean="0"/>
-              <a:t>I WANT to be able to search on an artist or song</a:t>
+              <a:t>I WANT to be able to search on an </a:t>
+            </a:r>
+            <a:r>
+              <a:rPr lang="en" dirty="0" smtClean="0"/>
+              <a:t>artist</a:t>
             </a:r>
             <a:r>
               <a:rPr lang="en" dirty="0"/>
@@ -6197,7 +6228,18 @@
             </a:br>
             <a:r>
               <a:rPr lang="en" dirty="0" smtClean="0"/>
-              <a:t>SO THAT I can see their songs/lyrics and listen to their music</a:t>
+              <a:t>SO THAT I can see their </a:t>
+            </a:r>
+            <a:r>
+              <a:rPr lang="en" dirty="0" smtClean="0"/>
+              <a:t>top 5 songs returned to me and,</a:t>
+            </a:r>
+            <a:br>
+              <a:rPr lang="en" dirty="0" smtClean="0"/>
+            </a:br>
+            <a:r>
+              <a:rPr lang="en" dirty="0" smtClean="0"/>
+              <a:t>SO THEN I can choose a song I want to listen to.</a:t>
             </a:r>
             <a:endParaRPr lang="en" dirty="0" smtClean="0"/>
           </a:p>
@@ -6208,6 +6250,13 @@
   <p:clrMapOvr>
     <a:masterClrMapping/>
   </p:clrMapOvr>
+  <p:timing>
+    <p:tnLst>
+      <p:par>
+        <p:cTn id="1" dur="indefinite" restart="never" nodeType="tmRoot"/>
+      </p:par>
+    </p:tnLst>
+  </p:timing>
 </p:sld>
 </file>
 
@@ -6324,8 +6373,13 @@
             </a:pPr>
             <a:r>
               <a:rPr lang="en" dirty="0" smtClean="0"/>
-              <a:t>Foundation Framework</a:t>
-            </a:r>
+              <a:t>Foundation </a:t>
+            </a:r>
+            <a:r>
+              <a:rPr lang="en" dirty="0" smtClean="0"/>
+              <a:t>Framework for HTML styling</a:t>
+            </a:r>
+            <a:endParaRPr lang="en" dirty="0" smtClean="0"/>
           </a:p>
           <a:p>
             <a:pPr lvl="1" indent="-342900">
@@ -6337,7 +6391,11 @@
             </a:pPr>
             <a:r>
               <a:rPr lang="en" dirty="0" smtClean="0"/>
-              <a:t>Deezer API</a:t>
+              <a:t>Deezer </a:t>
+            </a:r>
+            <a:r>
+              <a:rPr lang="en" dirty="0" smtClean="0"/>
+              <a:t>API for live time music search results</a:t>
             </a:r>
             <a:endParaRPr dirty="0"/>
           </a:p>
@@ -6413,25 +6471,90 @@
               <a:buChar char="●"/>
             </a:pPr>
             <a:r>
-              <a:rPr lang="en" dirty="0"/>
+              <a:rPr lang="en" dirty="0" smtClean="0"/>
               <a:t>Challenges</a:t>
             </a:r>
-            <a:endParaRPr dirty="0"/>
-          </a:p>
-          <a:p>
-            <a:pPr marL="457200" lvl="0" indent="-342900" algn="l" rtl="0">
-              <a:spcBef>
-                <a:spcPts val="0"/>
-              </a:spcBef>
-              <a:spcAft>
-                <a:spcPts val="0"/>
-              </a:spcAft>
+          </a:p>
+          <a:p>
+            <a:pPr lvl="1" indent="-342900">
+              <a:spcBef>
+                <a:spcPts val="0"/>
+              </a:spcBef>
               <a:buSzPts val="1800"/>
               <a:buChar char="●"/>
             </a:pPr>
             <a:r>
-              <a:rPr lang="en" dirty="0"/>
+              <a:rPr lang="en" dirty="0" smtClean="0"/>
+              <a:t>Merging classes/IDs between the HTML and JS was a challenge</a:t>
+            </a:r>
+          </a:p>
+          <a:p>
+            <a:pPr lvl="1" indent="-342900">
+              <a:spcBef>
+                <a:spcPts val="0"/>
+              </a:spcBef>
+              <a:buSzPts val="1800"/>
+              <a:buChar char="●"/>
+            </a:pPr>
+            <a:r>
+              <a:rPr lang="en" dirty="0" smtClean="0"/>
+              <a:t>API – the first few APIs we selected to use returned permissions/authentication errors so it took us a few attempts to find an API we could work with.</a:t>
+            </a:r>
+            <a:endParaRPr dirty="0"/>
+          </a:p>
+          <a:p>
+            <a:pPr marL="457200" lvl="0" indent="-342900" algn="l" rtl="0">
+              <a:spcBef>
+                <a:spcPts val="0"/>
+              </a:spcBef>
+              <a:spcAft>
+                <a:spcPts val="0"/>
+              </a:spcAft>
+              <a:buSzPts val="1800"/>
+              <a:buChar char="●"/>
+            </a:pPr>
+            <a:r>
+              <a:rPr lang="en" dirty="0" smtClean="0"/>
               <a:t>Successes</a:t>
+            </a:r>
+          </a:p>
+          <a:p>
+            <a:pPr lvl="1" indent="-342900">
+              <a:spcBef>
+                <a:spcPts val="0"/>
+              </a:spcBef>
+              <a:buSzPts val="1800"/>
+              <a:buChar char="●"/>
+            </a:pPr>
+            <a:r>
+              <a:rPr lang="en" dirty="0" smtClean="0"/>
+              <a:t>API – finally making a dynamic URL to call on for the API</a:t>
+            </a:r>
+          </a:p>
+          <a:p>
+            <a:pPr lvl="1" indent="-342900">
+              <a:spcBef>
+                <a:spcPts val="0"/>
+              </a:spcBef>
+              <a:buSzPts val="1800"/>
+              <a:buChar char="●"/>
+            </a:pPr>
+            <a:r>
+              <a:rPr lang="en" dirty="0" smtClean="0"/>
+              <a:t>Search Results – getting the user search history and search results to display on the screen</a:t>
+            </a:r>
+          </a:p>
+          <a:p>
+            <a:pPr lvl="1" indent="-342900">
+              <a:spcBef>
+                <a:spcPts val="0"/>
+              </a:spcBef>
+              <a:buSzPts val="1800"/>
+              <a:buChar char="●"/>
+            </a:pPr>
+            <a:r>
+              <a:rPr lang="en" dirty="0" smtClean="0"/>
+              <a:t>Foundation – learning a new CSS application and having it correctly display on our page</a:t>
             </a:r>
             <a:endParaRPr dirty="0"/>
           </a:p>
@@ -6442,6 +6565,13 @@
   <p:clrMapOvr>
     <a:masterClrMapping/>
   </p:clrMapOvr>
+  <p:timing>
+    <p:tnLst>
+      <p:par>
+        <p:cTn id="1" dur="indefinite" restart="never" nodeType="tmRoot"/>
+      </p:par>
+    </p:tnLst>
+  </p:timing>
 </p:sld>
 </file>
 
@@ -6473,6 +6603,10 @@
           </p:nvPr>
         </p:nvSpPr>
         <p:spPr>
+          <a:xfrm>
+            <a:off x="488346" y="46691"/>
+            <a:ext cx="8520600" cy="841800"/>
+          </a:xfrm>
           <a:prstGeom prst="rect">
             <a:avLst/>
           </a:prstGeom>
@@ -6493,18 +6627,49 @@
               <a:buNone/>
             </a:pPr>
             <a:r>
-              <a:rPr lang="en"/>
-              <a:t>Demo</a:t>
-            </a:r>
-            <a:endParaRPr/>
-          </a:p>
-        </p:txBody>
-      </p:sp>
+              <a:rPr lang="en" dirty="0" smtClean="0"/>
+              <a:t>Demo – Coming Soon!</a:t>
+            </a:r>
+            <a:endParaRPr dirty="0"/>
+          </a:p>
+        </p:txBody>
+      </p:sp>
+      <p:pic>
+        <p:nvPicPr>
+          <p:cNvPr id="2" name="Picture 1"/>
+          <p:cNvPicPr>
+            <a:picLocks noChangeAspect="1"/>
+          </p:cNvPicPr>
+          <p:nvPr/>
+        </p:nvPicPr>
+        <p:blipFill>
+          <a:blip r:embed="rId3"/>
+          <a:stretch>
+            <a:fillRect/>
+          </a:stretch>
+        </p:blipFill>
+        <p:spPr>
+          <a:xfrm>
+            <a:off x="660099" y="725596"/>
+            <a:ext cx="8302060" cy="3745420"/>
+          </a:xfrm>
+          <a:prstGeom prst="rect">
+            <a:avLst/>
+          </a:prstGeom>
+        </p:spPr>
+      </p:pic>
     </p:spTree>
   </p:cSld>
   <p:clrMapOvr>
     <a:masterClrMapping/>
   </p:clrMapOvr>
+  <p:timing>
+    <p:tnLst>
+      <p:par>
+        <p:cTn id="1" dur="indefinite" restart="never" nodeType="tmRoot"/>
+      </p:par>
+    </p:tnLst>
+  </p:timing>
 </p:sld>
 </file>
 
@@ -6592,16 +6757,50 @@
           </a:bodyPr>
           <a:lstStyle/>
           <a:p>
-            <a:pPr marL="0" lvl="0" indent="0" algn="l" rtl="0">
-              <a:spcBef>
-                <a:spcPts val="0"/>
-              </a:spcBef>
+            <a:pPr marL="285750" indent="-285750">
               <a:spcAft>
                 <a:spcPts val="1600"/>
               </a:spcAft>
-              <a:buNone/>
             </a:pPr>
-            <a:endParaRPr/>
+            <a:r>
+              <a:rPr lang="en-US" dirty="0" smtClean="0"/>
+              <a:t>Adding in a music/media player so that users have the option to play/listen to the songs that appear to them in the search results</a:t>
+            </a:r>
+          </a:p>
+          <a:p>
+            <a:pPr marL="285750" indent="-285750">
+              <a:spcAft>
+                <a:spcPts val="1600"/>
+              </a:spcAft>
+            </a:pPr>
+            <a:r>
+              <a:rPr lang="en-US" dirty="0" smtClean="0"/>
+              <a:t>Calling on an API to return song lyrics</a:t>
+            </a:r>
+            <a:endParaRPr lang="en-US" dirty="0" smtClean="0"/>
+          </a:p>
+          <a:p>
+            <a:pPr marL="285750" indent="-285750">
+              <a:spcAft>
+                <a:spcPts val="1600"/>
+              </a:spcAft>
+            </a:pPr>
+            <a:r>
+              <a:rPr lang="en-US" dirty="0" smtClean="0"/>
+              <a:t>Adding in an API so that users can view an image of the artist they searched on</a:t>
+            </a:r>
+          </a:p>
+          <a:p>
+            <a:pPr marL="285750" indent="-285750">
+              <a:spcAft>
+                <a:spcPts val="1600"/>
+              </a:spcAft>
+            </a:pPr>
+            <a:r>
+              <a:rPr lang="en-US" dirty="0" smtClean="0"/>
+              <a:t>Adding in an API so that users can see upcoming local events for the artist they searched on</a:t>
+            </a:r>
+            <a:endParaRPr dirty="0"/>
           </a:p>
         </p:txBody>
       </p:sp>
@@ -6610,6 +6809,13 @@
   <p:clrMapOvr>
     <a:masterClrMapping/>
   </p:clrMapOvr>
+  <p:timing>
+    <p:tnLst>
+      <p:par>
+        <p:cTn id="1" dur="indefinite" restart="never" nodeType="tmRoot"/>
+      </p:par>
+    </p:tnLst>
+  </p:timing>
 </p:sld>
 </file>
 
@@ -6665,8 +6871,8 @@
               <a:buNone/>
             </a:pPr>
             <a:r>
-              <a:rPr lang="en" dirty="0"/>
-              <a:t>Links</a:t>
+              <a:rPr lang="en" dirty="0" smtClean="0"/>
+              <a:t>Production Links</a:t>
             </a:r>
             <a:endParaRPr dirty="0"/>
           </a:p>
@@ -6745,6 +6951,13 @@
   <p:clrMapOvr>
     <a:masterClrMapping/>
   </p:clrMapOvr>
+  <p:timing>
+    <p:tnLst>
+      <p:par>
+        <p:cTn id="1" dur="indefinite" restart="never" nodeType="tmRoot"/>
+      </p:par>
+    </p:tnLst>
+  </p:timing>
 </p:sld>
 </file>
 

</xml_diff>